<commit_message>
S012 sample reports added
</commit_message>
<xml_diff>
--- a/data/s012/prescribe-presentation.pptx
+++ b/data/s012/prescribe-presentation.pptx
@@ -3172,7 +3172,7 @@
           <a:p>
             <a:pPr algn="ctr"/>
             <a:r>
-              <a:t>Generated on 2024-08-30 00:43:13</a:t>
+              <a:t>Generated on 2024-08-30 13:48:37</a:t>
             </a:r>
           </a:p>
         </p:txBody>
@@ -4000,7 +4000,7 @@
           <a:p>
             <a:pPr algn="ctr"/>
             <a:r>
-              <a:t>Generated on 2024-08-30 00:43:16</a:t>
+              <a:t>Generated on 2024-08-30 13:48:40</a:t>
             </a:r>
           </a:p>
         </p:txBody>

</xml_diff>

<commit_message>
removed layout from sub-pages
</commit_message>
<xml_diff>
--- a/data/s012/prescribe-presentation.pptx
+++ b/data/s012/prescribe-presentation.pptx
@@ -3172,7 +3172,7 @@
           <a:p>
             <a:pPr algn="ctr"/>
             <a:r>
-              <a:t>Generated on 2024-08-30 16:08:51</a:t>
+              <a:t>Generated on 2024-08-30 16:26:24</a:t>
             </a:r>
           </a:p>
         </p:txBody>
@@ -4000,7 +4000,7 @@
           <a:p>
             <a:pPr algn="ctr"/>
             <a:r>
-              <a:t>Generated on 2024-08-30 16:08:54</a:t>
+              <a:t>Generated on 2024-08-30 16:26:27</a:t>
             </a:r>
           </a:p>
         </p:txBody>

</xml_diff>

<commit_message>
Added layout to all pages
</commit_message>
<xml_diff>
--- a/data/s012/prescribe-presentation.pptx
+++ b/data/s012/prescribe-presentation.pptx
@@ -3172,7 +3172,7 @@
           <a:p>
             <a:pPr algn="ctr"/>
             <a:r>
-              <a:t>Generated on 2024-08-30 16:26:24</a:t>
+              <a:t>Generated on 2024-08-30 16:32:21</a:t>
             </a:r>
           </a:p>
         </p:txBody>
@@ -4000,7 +4000,7 @@
           <a:p>
             <a:pPr algn="ctr"/>
             <a:r>
-              <a:t>Generated on 2024-08-30 16:26:27</a:t>
+              <a:t>Generated on 2024-08-30 16:32:25</a:t>
             </a:r>
           </a:p>
         </p:txBody>

</xml_diff>

<commit_message>
Added both detailed and summarized reports
</commit_message>
<xml_diff>
--- a/data/s012/prescribe-presentation.pptx
+++ b/data/s012/prescribe-presentation.pptx
@@ -3176,7 +3176,7 @@
           <a:p>
             <a:pPr algn="ctr"/>
             <a:r>
-              <a:t>Generated on 2024-09-01 01:00:31</a:t>
+              <a:t>Generated on 2024-09-01 01:42:02</a:t>
             </a:r>
           </a:p>
         </p:txBody>
@@ -4256,7 +4256,7 @@
           <a:p>
             <a:pPr algn="ctr"/>
             <a:r>
-              <a:t>Generated on 2024-09-01 01:00:35</a:t>
+              <a:t>Generated on 2024-09-01 01:42:06</a:t>
             </a:r>
           </a:p>
         </p:txBody>
@@ -4580,7 +4580,7 @@
           <a:p>
             <a:pPr algn="ctr"/>
             <a:r>
-              <a:t>Generated on 2024-09-01 01:00:31</a:t>
+              <a:t>Generated on 2024-09-01 01:42:02</a:t>
             </a:r>
           </a:p>
         </p:txBody>

</xml_diff>

<commit_message>
ECG+PPG report for S012
</commit_message>
<xml_diff>
--- a/data/s012/prescribe-presentation.pptx
+++ b/data/s012/prescribe-presentation.pptx
@@ -3176,7 +3176,7 @@
           <a:p>
             <a:pPr algn="ctr"/>
             <a:r>
-              <a:t>Generated on 2024-09-01 01:44:52</a:t>
+              <a:t>Generated on 2024-09-01 23:23:21</a:t>
             </a:r>
           </a:p>
         </p:txBody>
@@ -4256,7 +4256,7 @@
           <a:p>
             <a:pPr algn="ctr"/>
             <a:r>
-              <a:t>Generated on 2024-09-01 01:44:55</a:t>
+              <a:t>Generated on 2024-09-01 23:23:24</a:t>
             </a:r>
           </a:p>
         </p:txBody>
@@ -4580,7 +4580,7 @@
           <a:p>
             <a:pPr algn="ctr"/>
             <a:r>
-              <a:t>Generated on 2024-09-01 01:44:52</a:t>
+              <a:t>Generated on 2024-09-01 23:23:21</a:t>
             </a:r>
           </a:p>
         </p:txBody>

</xml_diff>

<commit_message>
BP reports for S012
</commit_message>
<xml_diff>
--- a/data/s012/prescribe-presentation.pptx
+++ b/data/s012/prescribe-presentation.pptx
@@ -3176,7 +3176,7 @@
           <a:p>
             <a:pPr algn="ctr"/>
             <a:r>
-              <a:t>Generated on 2024-09-01 23:23:21</a:t>
+              <a:t>Generated on 2024-09-02 10:53:43</a:t>
             </a:r>
           </a:p>
         </p:txBody>
@@ -3215,7 +3215,7 @@
           <a:lstStyle/>
           <a:p>
             <a:r>
-              <a:t>rr: RR Interval (ms)</a:t>
+              <a:t>rr: RR Interval</a:t>
             </a:r>
           </a:p>
         </p:txBody>
@@ -3278,7 +3278,7 @@
           <a:lstStyle/>
           <a:p>
             <a:r>
-              <a:t>rr_refined: RR Refined (ms)</a:t>
+              <a:t>rr_refined: RR Refined</a:t>
             </a:r>
           </a:p>
         </p:txBody>
@@ -3341,7 +3341,7 @@
           <a:lstStyle/>
           <a:p>
             <a:r>
-              <a:t>rr_smoothed: RR Smoothed (ms)</a:t>
+              <a:t>rr_smoothed: RR Smoothed</a:t>
             </a:r>
           </a:p>
         </p:txBody>
@@ -3404,7 +3404,7 @@
           <a:lstStyle/>
           <a:p>
             <a:r>
-              <a:t>qt: QT Interval (ms)</a:t>
+              <a:t>qt: QT Interval</a:t>
             </a:r>
           </a:p>
         </p:txBody>
@@ -3467,7 +3467,7 @@
           <a:lstStyle/>
           <a:p>
             <a:r>
-              <a:t>qt_refined: QT Refined (ms)</a:t>
+              <a:t>qt_refined: QT Refined</a:t>
             </a:r>
           </a:p>
         </p:txBody>
@@ -3530,7 +3530,7 @@
           <a:lstStyle/>
           <a:p>
             <a:r>
-              <a:t>qt_smoothed: QT Smoothed (ms)</a:t>
+              <a:t>qt_smoothed: QT Smoothed</a:t>
             </a:r>
           </a:p>
         </p:txBody>
@@ -3782,7 +3782,7 @@
           <a:lstStyle/>
           <a:p>
             <a:r>
-              <a:t>qrs: QRS Duration (ms)</a:t>
+              <a:t>qrs: QRS Duration</a:t>
             </a:r>
           </a:p>
         </p:txBody>
@@ -3908,7 +3908,7 @@
           <a:lstStyle/>
           <a:p>
             <a:r>
-              <a:t>qrs_refined: QRS Duration Refined (ms)</a:t>
+              <a:t>qrs_refined: QRS Duration Refined</a:t>
             </a:r>
           </a:p>
         </p:txBody>
@@ -3971,7 +3971,7 @@
           <a:lstStyle/>
           <a:p>
             <a:r>
-              <a:t>qrs_smoothed: QRS Duration Smoothed (ms)</a:t>
+              <a:t>qrs_smoothed: QRS Duration Smoothed</a:t>
             </a:r>
           </a:p>
         </p:txBody>
@@ -4256,7 +4256,7 @@
           <a:p>
             <a:pPr algn="ctr"/>
             <a:r>
-              <a:t>Generated on 2024-09-01 23:23:24</a:t>
+              <a:t>Generated on 2024-09-02 10:53:46</a:t>
             </a:r>
           </a:p>
         </p:txBody>
@@ -4580,7 +4580,7 @@
           <a:p>
             <a:pPr algn="ctr"/>
             <a:r>
-              <a:t>Generated on 2024-09-01 23:23:21</a:t>
+              <a:t>Generated on 2024-09-02 10:53:43</a:t>
             </a:r>
           </a:p>
         </p:txBody>
@@ -5249,7 +5249,7 @@
           <a:lstStyle/>
           <a:p>
             <a:r>
-              <a:t>r_amps: R Amplitudes (mV)</a:t>
+              <a:t>r_amps: R Amplitudes</a:t>
             </a:r>
           </a:p>
         </p:txBody>
@@ -5375,7 +5375,7 @@
           <a:lstStyle/>
           <a:p>
             <a:r>
-              <a:t>r_amps_refined: R Amplitudes Refined (mV)</a:t>
+              <a:t>r_amps_refined: R Amplitudes Refined</a:t>
             </a:r>
           </a:p>
         </p:txBody>
@@ -5438,7 +5438,7 @@
           <a:lstStyle/>
           <a:p>
             <a:r>
-              <a:t>r_amps_smoothed: R Amplitudes Smoothed (mV)</a:t>
+              <a:t>r_amps_smoothed: R Amplitudes Smoothed</a:t>
             </a:r>
           </a:p>
         </p:txBody>
@@ -5501,7 +5501,7 @@
           <a:lstStyle/>
           <a:p>
             <a:r>
-              <a:t>hr: Heart Rate (BPM)</a:t>
+              <a:t>hr: Heart Rate</a:t>
             </a:r>
           </a:p>
         </p:txBody>
@@ -5564,7 +5564,7 @@
           <a:lstStyle/>
           <a:p>
             <a:r>
-              <a:t>hr_refined: Heart Rate Refined (BPM)</a:t>
+              <a:t>hr_refined: Heart Rate Refined</a:t>
             </a:r>
           </a:p>
         </p:txBody>
@@ -5627,7 +5627,7 @@
           <a:lstStyle/>
           <a:p>
             <a:r>
-              <a:t>hr_smoothed: Heart Rate Smoothed (BPM)</a:t>
+              <a:t>hr_smoothed: Heart Rate Smoothed</a:t>
             </a:r>
           </a:p>
         </p:txBody>

</xml_diff>

<commit_message>
EDA reports for S012
</commit_message>
<xml_diff>
--- a/data/s012/prescribe-presentation.pptx
+++ b/data/s012/prescribe-presentation.pptx
@@ -3176,7 +3176,7 @@
           <a:p>
             <a:pPr algn="ctr"/>
             <a:r>
-              <a:t>Generated on 2024-09-02 10:53:43</a:t>
+              <a:t>Generated on 2024-09-02 21:26:02</a:t>
             </a:r>
           </a:p>
         </p:txBody>
@@ -4256,7 +4256,7 @@
           <a:p>
             <a:pPr algn="ctr"/>
             <a:r>
-              <a:t>Generated on 2024-09-02 10:53:46</a:t>
+              <a:t>Generated on 2024-09-02 21:26:05</a:t>
             </a:r>
           </a:p>
         </p:txBody>
@@ -4580,7 +4580,7 @@
           <a:p>
             <a:pPr algn="ctr"/>
             <a:r>
-              <a:t>Generated on 2024-09-02 10:53:43</a:t>
+              <a:t>Generated on 2024-09-02 21:26:02</a:t>
             </a:r>
           </a:p>
         </p:txBody>

</xml_diff>

<commit_message>
EEG and PPG reports for S012
</commit_message>
<xml_diff>
--- a/data/s012/prescribe-presentation.pptx
+++ b/data/s012/prescribe-presentation.pptx
@@ -3176,7 +3176,7 @@
           <a:p>
             <a:pPr algn="ctr"/>
             <a:r>
-              <a:t>Generated on 2024-09-02 21:26:02</a:t>
+              <a:t>Generated on 2024-09-02 22:19:01</a:t>
             </a:r>
           </a:p>
         </p:txBody>
@@ -4256,7 +4256,7 @@
           <a:p>
             <a:pPr algn="ctr"/>
             <a:r>
-              <a:t>Generated on 2024-09-02 21:26:05</a:t>
+              <a:t>Generated on 2024-09-02 22:19:04</a:t>
             </a:r>
           </a:p>
         </p:txBody>
@@ -4580,7 +4580,7 @@
           <a:p>
             <a:pPr algn="ctr"/>
             <a:r>
-              <a:t>Generated on 2024-09-02 21:26:02</a:t>
+              <a:t>Generated on 2024-09-02 22:19:02</a:t>
             </a:r>
           </a:p>
         </p:txBody>

</xml_diff>